<commit_message>
replaced Azure Notebooks with Compute Instance to run the notebooks
</commit_message>
<xml_diff>
--- a/Media/Diagrams.pptx
+++ b/Media/Diagrams.pptx
@@ -261,7 +261,7 @@
           <a:p>
             <a:fld id="{B7E4EED9-D2B4-4FCD-A863-CDA8AF4DEF0D}" type="datetimeFigureOut">
               <a:rPr lang="en-US" smtClean="0"/>
-              <a:t>12/2/2019</a:t>
+              <a:t>2/25/2020</a:t>
             </a:fld>
             <a:endParaRPr lang="en-US"/>
           </a:p>
@@ -459,7 +459,7 @@
           <a:p>
             <a:fld id="{B7E4EED9-D2B4-4FCD-A863-CDA8AF4DEF0D}" type="datetimeFigureOut">
               <a:rPr lang="en-US" smtClean="0"/>
-              <a:t>12/2/2019</a:t>
+              <a:t>2/25/2020</a:t>
             </a:fld>
             <a:endParaRPr lang="en-US"/>
           </a:p>
@@ -667,7 +667,7 @@
           <a:p>
             <a:fld id="{B7E4EED9-D2B4-4FCD-A863-CDA8AF4DEF0D}" type="datetimeFigureOut">
               <a:rPr lang="en-US" smtClean="0"/>
-              <a:t>12/2/2019</a:t>
+              <a:t>2/25/2020</a:t>
             </a:fld>
             <a:endParaRPr lang="en-US"/>
           </a:p>
@@ -865,7 +865,7 @@
           <a:p>
             <a:fld id="{B7E4EED9-D2B4-4FCD-A863-CDA8AF4DEF0D}" type="datetimeFigureOut">
               <a:rPr lang="en-US" smtClean="0"/>
-              <a:t>12/2/2019</a:t>
+              <a:t>2/25/2020</a:t>
             </a:fld>
             <a:endParaRPr lang="en-US"/>
           </a:p>
@@ -1140,7 +1140,7 @@
           <a:p>
             <a:fld id="{B7E4EED9-D2B4-4FCD-A863-CDA8AF4DEF0D}" type="datetimeFigureOut">
               <a:rPr lang="en-US" smtClean="0"/>
-              <a:t>12/2/2019</a:t>
+              <a:t>2/25/2020</a:t>
             </a:fld>
             <a:endParaRPr lang="en-US"/>
           </a:p>
@@ -1405,7 +1405,7 @@
           <a:p>
             <a:fld id="{B7E4EED9-D2B4-4FCD-A863-CDA8AF4DEF0D}" type="datetimeFigureOut">
               <a:rPr lang="en-US" smtClean="0"/>
-              <a:t>12/2/2019</a:t>
+              <a:t>2/25/2020</a:t>
             </a:fld>
             <a:endParaRPr lang="en-US"/>
           </a:p>
@@ -1817,7 +1817,7 @@
           <a:p>
             <a:fld id="{B7E4EED9-D2B4-4FCD-A863-CDA8AF4DEF0D}" type="datetimeFigureOut">
               <a:rPr lang="en-US" smtClean="0"/>
-              <a:t>12/2/2019</a:t>
+              <a:t>2/25/2020</a:t>
             </a:fld>
             <a:endParaRPr lang="en-US"/>
           </a:p>
@@ -1958,7 +1958,7 @@
           <a:p>
             <a:fld id="{B7E4EED9-D2B4-4FCD-A863-CDA8AF4DEF0D}" type="datetimeFigureOut">
               <a:rPr lang="en-US" smtClean="0"/>
-              <a:t>12/2/2019</a:t>
+              <a:t>2/25/2020</a:t>
             </a:fld>
             <a:endParaRPr lang="en-US"/>
           </a:p>
@@ -2071,7 +2071,7 @@
           <a:p>
             <a:fld id="{B7E4EED9-D2B4-4FCD-A863-CDA8AF4DEF0D}" type="datetimeFigureOut">
               <a:rPr lang="en-US" smtClean="0"/>
-              <a:t>12/2/2019</a:t>
+              <a:t>2/25/2020</a:t>
             </a:fld>
             <a:endParaRPr lang="en-US"/>
           </a:p>
@@ -2382,7 +2382,7 @@
           <a:p>
             <a:fld id="{B7E4EED9-D2B4-4FCD-A863-CDA8AF4DEF0D}" type="datetimeFigureOut">
               <a:rPr lang="en-US" smtClean="0"/>
-              <a:t>12/2/2019</a:t>
+              <a:t>2/25/2020</a:t>
             </a:fld>
             <a:endParaRPr lang="en-US"/>
           </a:p>
@@ -2670,7 +2670,7 @@
           <a:p>
             <a:fld id="{B7E4EED9-D2B4-4FCD-A863-CDA8AF4DEF0D}" type="datetimeFigureOut">
               <a:rPr lang="en-US" smtClean="0"/>
-              <a:t>12/2/2019</a:t>
+              <a:t>2/25/2020</a:t>
             </a:fld>
             <a:endParaRPr lang="en-US"/>
           </a:p>
@@ -2911,7 +2911,7 @@
           <a:p>
             <a:fld id="{B7E4EED9-D2B4-4FCD-A863-CDA8AF4DEF0D}" type="datetimeFigureOut">
               <a:rPr lang="en-US" smtClean="0"/>
-              <a:t>12/2/2019</a:t>
+              <a:t>2/25/2020</a:t>
             </a:fld>
             <a:endParaRPr lang="en-US"/>
           </a:p>
@@ -3555,9 +3555,9 @@
         <p:grpSpPr>
           <a:xfrm>
             <a:off x="122697" y="120919"/>
-            <a:ext cx="1210785" cy="1386582"/>
+            <a:ext cx="1217211" cy="1384525"/>
             <a:chOff x="5269750" y="1438188"/>
-            <a:chExt cx="1210785" cy="1386582"/>
+            <a:chExt cx="1217211" cy="1384525"/>
           </a:xfrm>
         </p:grpSpPr>
         <p:sp>
@@ -3611,107 +3611,50 @@
             </a:p>
           </p:txBody>
         </p:sp>
-        <p:grpSp>
-          <p:nvGrpSpPr>
-            <p:cNvPr id="167" name="Group 166">
+        <p:sp>
+          <p:nvSpPr>
+            <p:cNvPr id="169" name="TextBox 168">
               <a:extLst>
                 <a:ext uri="{FF2B5EF4-FFF2-40B4-BE49-F238E27FC236}">
-                  <a16:creationId xmlns:a16="http://schemas.microsoft.com/office/drawing/2014/main" id="{DBFAA4BD-4A8E-45BF-886A-BFBB1B8CD2F9}"/>
+                  <a16:creationId xmlns:a16="http://schemas.microsoft.com/office/drawing/2014/main" id="{B829A4AA-2F99-4138-87C2-E1F1805A06D8}"/>
                 </a:ext>
               </a:extLst>
             </p:cNvPr>
-            <p:cNvGrpSpPr/>
+            <p:cNvSpPr txBox="1"/>
             <p:nvPr/>
-          </p:nvGrpSpPr>
-          <p:grpSpPr>
+          </p:nvSpPr>
+          <p:spPr>
             <a:xfrm>
-              <a:off x="5269750" y="1550249"/>
-              <a:ext cx="1210785" cy="1274521"/>
-              <a:chOff x="4319032" y="3033136"/>
-              <a:chExt cx="1210785" cy="1274521"/>
+              <a:off x="5276176" y="2201220"/>
+              <a:ext cx="1210785" cy="615553"/>
             </a:xfrm>
-          </p:grpSpPr>
-          <p:pic>
-            <p:nvPicPr>
-              <p:cNvPr id="168" name="Graphic 167">
-                <a:extLst>
-                  <a:ext uri="{FF2B5EF4-FFF2-40B4-BE49-F238E27FC236}">
-                    <a16:creationId xmlns:a16="http://schemas.microsoft.com/office/drawing/2014/main" id="{2781A7B2-05C6-4857-9571-F9AAEE0D1D1A}"/>
-                  </a:ext>
-                </a:extLst>
-              </p:cNvPr>
-              <p:cNvPicPr>
-                <a:picLocks noChangeAspect="1"/>
-              </p:cNvPicPr>
-              <p:nvPr/>
-            </p:nvPicPr>
-            <p:blipFill>
-              <a:blip r:embed="rId4">
-                <a:extLst>
-                  <a:ext uri="{28A0092B-C50C-407E-A947-70E740481C1C}">
-                    <a14:useLocalDpi xmlns:a14="http://schemas.microsoft.com/office/drawing/2010/main" val="0"/>
-                  </a:ext>
-                </a:extLst>
-              </a:blip>
-              <a:stretch>
-                <a:fillRect/>
-              </a:stretch>
-            </p:blipFill>
-            <p:spPr>
-              <a:xfrm>
-                <a:off x="4686300" y="3033136"/>
-                <a:ext cx="476250" cy="360967"/>
-              </a:xfrm>
-              <a:prstGeom prst="rect">
-                <a:avLst/>
-              </a:prstGeom>
-            </p:spPr>
-          </p:pic>
-          <p:sp>
-            <p:nvSpPr>
-              <p:cNvPr id="169" name="TextBox 168">
-                <a:extLst>
-                  <a:ext uri="{FF2B5EF4-FFF2-40B4-BE49-F238E27FC236}">
-                    <a16:creationId xmlns:a16="http://schemas.microsoft.com/office/drawing/2014/main" id="{B829A4AA-2F99-4138-87C2-E1F1805A06D8}"/>
-                  </a:ext>
-                </a:extLst>
-              </p:cNvPr>
-              <p:cNvSpPr txBox="1"/>
-              <p:nvPr/>
-            </p:nvSpPr>
-            <p:spPr>
-              <a:xfrm>
-                <a:off x="4319032" y="3476660"/>
-                <a:ext cx="1210785" cy="830997"/>
-              </a:xfrm>
-              <a:prstGeom prst="rect">
-                <a:avLst/>
-              </a:prstGeom>
-              <a:noFill/>
-            </p:spPr>
-            <p:txBody>
-              <a:bodyPr wrap="square" rtlCol="0">
-                <a:spAutoFit/>
-              </a:bodyPr>
-              <a:lstStyle/>
-              <a:p>
-                <a:pPr algn="ctr"/>
-                <a:r>
-                  <a:rPr lang="en-US" sz="1400" dirty="0"/>
-                  <a:t>Azure Notebooks</a:t>
-                </a:r>
-                <a:endParaRPr lang="en-US" sz="1100" dirty="0"/>
-              </a:p>
-              <a:p>
-                <a:pPr algn="ctr"/>
-                <a:r>
-                  <a:rPr lang="en-US" sz="1000" dirty="0"/>
-                  <a:t>ML Pipeline, Train, Eval Scripts</a:t>
-                </a:r>
-              </a:p>
-            </p:txBody>
-          </p:sp>
-        </p:grpSp>
+            <a:prstGeom prst="rect">
+              <a:avLst/>
+            </a:prstGeom>
+            <a:noFill/>
+          </p:spPr>
+          <p:txBody>
+            <a:bodyPr wrap="square" rtlCol="0">
+              <a:spAutoFit/>
+            </a:bodyPr>
+            <a:lstStyle/>
+            <a:p>
+              <a:pPr algn="ctr"/>
+              <a:r>
+                <a:rPr lang="en-US" sz="1400" dirty="0"/>
+                <a:t>Notebooks</a:t>
+              </a:r>
+              <a:endParaRPr lang="en-US" sz="1100" dirty="0"/>
+            </a:p>
+            <a:p>
+              <a:pPr algn="ctr"/>
+              <a:r>
+                <a:rPr lang="en-US" sz="1000" dirty="0"/>
+                <a:t>ML Pipeline, Train, Eval Scripts</a:t>
+              </a:r>
+            </a:p>
+          </p:txBody>
+        </p:sp>
       </p:grpSp>
       <p:grpSp>
         <p:nvGrpSpPr>
@@ -3819,13 +3762,13 @@
               <p:nvPr/>
             </p:nvPicPr>
             <p:blipFill>
-              <a:blip r:embed="rId5">
+              <a:blip r:embed="rId4">
                 <a:extLst>
                   <a:ext uri="{28A0092B-C50C-407E-A947-70E740481C1C}">
                     <a14:useLocalDpi xmlns:a14="http://schemas.microsoft.com/office/drawing/2010/main" val="0"/>
                   </a:ext>
                   <a:ext uri="{96DAC541-7B7A-43D3-8B79-37D633B846F1}">
-                    <asvg:svgBlip xmlns:asvg="http://schemas.microsoft.com/office/drawing/2016/SVG/main" r:embed="rId6"/>
+                    <asvg:svgBlip xmlns:asvg="http://schemas.microsoft.com/office/drawing/2016/SVG/main" r:embed="rId5"/>
                   </a:ext>
                 </a:extLst>
               </a:blip>
@@ -3975,13 +3918,13 @@
             <p:nvPr/>
           </p:nvPicPr>
           <p:blipFill>
-            <a:blip r:embed="rId7">
+            <a:blip r:embed="rId6">
               <a:extLst>
                 <a:ext uri="{28A0092B-C50C-407E-A947-70E740481C1C}">
                   <a14:useLocalDpi xmlns:a14="http://schemas.microsoft.com/office/drawing/2010/main" val="0"/>
                 </a:ext>
                 <a:ext uri="{96DAC541-7B7A-43D3-8B79-37D633B846F1}">
-                  <asvg:svgBlip xmlns:asvg="http://schemas.microsoft.com/office/drawing/2016/SVG/main" r:embed="rId8"/>
+                  <asvg:svgBlip xmlns:asvg="http://schemas.microsoft.com/office/drawing/2016/SVG/main" r:embed="rId7"/>
                 </a:ext>
               </a:extLst>
             </a:blip>
@@ -4324,13 +4267,13 @@
               <p:nvPr/>
             </p:nvPicPr>
             <p:blipFill>
-              <a:blip r:embed="rId9">
+              <a:blip r:embed="rId8">
                 <a:extLst>
                   <a:ext uri="{28A0092B-C50C-407E-A947-70E740481C1C}">
                     <a14:useLocalDpi xmlns:a14="http://schemas.microsoft.com/office/drawing/2010/main" val="0"/>
                   </a:ext>
                   <a:ext uri="{96DAC541-7B7A-43D3-8B79-37D633B846F1}">
-                    <asvg:svgBlip xmlns:asvg="http://schemas.microsoft.com/office/drawing/2016/SVG/main" r:embed="rId10"/>
+                    <asvg:svgBlip xmlns:asvg="http://schemas.microsoft.com/office/drawing/2016/SVG/main" r:embed="rId9"/>
                   </a:ext>
                 </a:extLst>
               </a:blip>
@@ -4580,7 +4523,7 @@
                 <p:nvPr/>
               </p:nvPicPr>
               <p:blipFill>
-                <a:blip r:embed="rId11">
+                <a:blip r:embed="rId10">
                   <a:extLst>
                     <a:ext uri="{28A0092B-C50C-407E-A947-70E740481C1C}">
                       <a14:useLocalDpi xmlns:a14="http://schemas.microsoft.com/office/drawing/2010/main" val="0"/>
@@ -4753,7 +4696,7 @@
                 <p:nvPr/>
               </p:nvPicPr>
               <p:blipFill>
-                <a:blip r:embed="rId12">
+                <a:blip r:embed="rId11">
                   <a:extLst>
                     <a:ext uri="{28A0092B-C50C-407E-A947-70E740481C1C}">
                       <a14:useLocalDpi xmlns:a14="http://schemas.microsoft.com/office/drawing/2010/main" val="0"/>
@@ -5105,13 +5048,13 @@
             <p:nvPr/>
           </p:nvPicPr>
           <p:blipFill>
-            <a:blip r:embed="rId9">
+            <a:blip r:embed="rId8">
               <a:extLst>
                 <a:ext uri="{28A0092B-C50C-407E-A947-70E740481C1C}">
                   <a14:useLocalDpi xmlns:a14="http://schemas.microsoft.com/office/drawing/2010/main" val="0"/>
                 </a:ext>
                 <a:ext uri="{96DAC541-7B7A-43D3-8B79-37D633B846F1}">
-                  <asvg:svgBlip xmlns:asvg="http://schemas.microsoft.com/office/drawing/2016/SVG/main" r:embed="rId10"/>
+                  <asvg:svgBlip xmlns:asvg="http://schemas.microsoft.com/office/drawing/2016/SVG/main" r:embed="rId9"/>
                 </a:ext>
               </a:extLst>
             </a:blip>
@@ -6246,13 +6189,13 @@
               <p:nvPr/>
             </p:nvPicPr>
             <p:blipFill>
-              <a:blip r:embed="rId9">
+              <a:blip r:embed="rId8">
                 <a:extLst>
                   <a:ext uri="{28A0092B-C50C-407E-A947-70E740481C1C}">
                     <a14:useLocalDpi xmlns:a14="http://schemas.microsoft.com/office/drawing/2010/main" val="0"/>
                   </a:ext>
                   <a:ext uri="{96DAC541-7B7A-43D3-8B79-37D633B846F1}">
-                    <asvg:svgBlip xmlns:asvg="http://schemas.microsoft.com/office/drawing/2016/SVG/main" r:embed="rId10"/>
+                    <asvg:svgBlip xmlns:asvg="http://schemas.microsoft.com/office/drawing/2016/SVG/main" r:embed="rId9"/>
                   </a:ext>
                 </a:extLst>
               </a:blip>
@@ -6905,13 +6848,13 @@
             <p:nvPr/>
           </p:nvPicPr>
           <p:blipFill>
-            <a:blip r:embed="rId9">
+            <a:blip r:embed="rId8">
               <a:extLst>
                 <a:ext uri="{28A0092B-C50C-407E-A947-70E740481C1C}">
                   <a14:useLocalDpi xmlns:a14="http://schemas.microsoft.com/office/drawing/2010/main" val="0"/>
                 </a:ext>
                 <a:ext uri="{96DAC541-7B7A-43D3-8B79-37D633B846F1}">
-                  <asvg:svgBlip xmlns:asvg="http://schemas.microsoft.com/office/drawing/2016/SVG/main" r:embed="rId10"/>
+                  <asvg:svgBlip xmlns:asvg="http://schemas.microsoft.com/office/drawing/2016/SVG/main" r:embed="rId9"/>
                 </a:ext>
               </a:extLst>
             </a:blip>
@@ -8098,13 +8041,13 @@
             <p:nvPr/>
           </p:nvPicPr>
           <p:blipFill>
-            <a:blip r:embed="rId13">
+            <a:blip r:embed="rId12">
               <a:extLst>
                 <a:ext uri="{28A0092B-C50C-407E-A947-70E740481C1C}">
                   <a14:useLocalDpi xmlns:a14="http://schemas.microsoft.com/office/drawing/2010/main" val="0"/>
                 </a:ext>
                 <a:ext uri="{96DAC541-7B7A-43D3-8B79-37D633B846F1}">
-                  <asvg:svgBlip xmlns:asvg="http://schemas.microsoft.com/office/drawing/2016/SVG/main" r:embed="rId14"/>
+                  <asvg:svgBlip xmlns:asvg="http://schemas.microsoft.com/office/drawing/2016/SVG/main" r:embed="rId13"/>
                 </a:ext>
               </a:extLst>
             </a:blip>
@@ -8182,7 +8125,7 @@
         </p:nvGrpSpPr>
         <p:grpSpPr>
           <a:xfrm>
-            <a:off x="7889776" y="4217005"/>
+            <a:off x="7889776" y="4250622"/>
             <a:ext cx="1210785" cy="1332162"/>
             <a:chOff x="4319032" y="2975495"/>
             <a:chExt cx="1210785" cy="1332162"/>
@@ -8476,6 +8419,75 @@
           </a:p>
         </p:txBody>
       </p:sp>
+      <p:pic>
+        <p:nvPicPr>
+          <p:cNvPr id="120" name="Graphic 119">
+            <a:extLst>
+              <a:ext uri="{FF2B5EF4-FFF2-40B4-BE49-F238E27FC236}">
+                <a16:creationId xmlns:a16="http://schemas.microsoft.com/office/drawing/2014/main" id="{C56ADF06-130D-4ECD-AD08-664B5DD471D7}"/>
+              </a:ext>
+            </a:extLst>
+          </p:cNvPr>
+          <p:cNvPicPr>
+            <a:picLocks noChangeAspect="1"/>
+          </p:cNvPicPr>
+          <p:nvPr/>
+        </p:nvPicPr>
+        <p:blipFill>
+          <a:blip r:embed="rId2">
+            <a:extLst>
+              <a:ext uri="{28A0092B-C50C-407E-A947-70E740481C1C}">
+                <a14:useLocalDpi xmlns:a14="http://schemas.microsoft.com/office/drawing/2010/main" val="0"/>
+              </a:ext>
+              <a:ext uri="{96DAC541-7B7A-43D3-8B79-37D633B846F1}">
+                <asvg:svgBlip xmlns:asvg="http://schemas.microsoft.com/office/drawing/2016/SVG/main" r:embed="rId3"/>
+              </a:ext>
+            </a:extLst>
+          </a:blip>
+          <a:stretch>
+            <a:fillRect/>
+          </a:stretch>
+        </p:blipFill>
+        <p:spPr>
+          <a:xfrm>
+            <a:off x="506940" y="447173"/>
+            <a:ext cx="442298" cy="476250"/>
+          </a:xfrm>
+          <a:prstGeom prst="rect">
+            <a:avLst/>
+          </a:prstGeom>
+        </p:spPr>
+      </p:pic>
+      <p:pic>
+        <p:nvPicPr>
+          <p:cNvPr id="2" name="Picture 1">
+            <a:extLst>
+              <a:ext uri="{FF2B5EF4-FFF2-40B4-BE49-F238E27FC236}">
+                <a16:creationId xmlns:a16="http://schemas.microsoft.com/office/drawing/2014/main" id="{CAEDA8C3-8D93-4E77-B4F3-23340EE34D33}"/>
+              </a:ext>
+            </a:extLst>
+          </p:cNvPr>
+          <p:cNvPicPr>
+            <a:picLocks noChangeAspect="1"/>
+          </p:cNvPicPr>
+          <p:nvPr/>
+        </p:nvPicPr>
+        <p:blipFill>
+          <a:blip r:embed="rId14"/>
+          <a:stretch>
+            <a:fillRect/>
+          </a:stretch>
+        </p:blipFill>
+        <p:spPr>
+          <a:xfrm>
+            <a:off x="834489" y="256651"/>
+            <a:ext cx="442041" cy="428544"/>
+          </a:xfrm>
+          <a:prstGeom prst="rect">
+            <a:avLst/>
+          </a:prstGeom>
+        </p:spPr>
+      </p:pic>
     </p:spTree>
     <p:extLst>
       <p:ext uri="{BB962C8B-B14F-4D97-AF65-F5344CB8AC3E}">
@@ -8720,179 +8732,6 @@
       </p:sp>
       <p:grpSp>
         <p:nvGrpSpPr>
-          <p:cNvPr id="165" name="Group 164">
-            <a:extLst>
-              <a:ext uri="{FF2B5EF4-FFF2-40B4-BE49-F238E27FC236}">
-                <a16:creationId xmlns:a16="http://schemas.microsoft.com/office/drawing/2014/main" id="{A2828C11-C9C0-47CF-8565-E1F41E989C6E}"/>
-              </a:ext>
-            </a:extLst>
-          </p:cNvPr>
-          <p:cNvGrpSpPr/>
-          <p:nvPr/>
-        </p:nvGrpSpPr>
-        <p:grpSpPr>
-          <a:xfrm>
-            <a:off x="122697" y="120919"/>
-            <a:ext cx="1210785" cy="1386582"/>
-            <a:chOff x="5269750" y="1438188"/>
-            <a:chExt cx="1210785" cy="1386582"/>
-          </a:xfrm>
-        </p:grpSpPr>
-        <p:sp>
-          <p:nvSpPr>
-            <p:cNvPr id="166" name="Rectangle: Rounded Corners 165">
-              <a:extLst>
-                <a:ext uri="{FF2B5EF4-FFF2-40B4-BE49-F238E27FC236}">
-                  <a16:creationId xmlns:a16="http://schemas.microsoft.com/office/drawing/2014/main" id="{0850A5DD-586D-48A8-82F0-B5859B14195F}"/>
-                </a:ext>
-              </a:extLst>
-            </p:cNvPr>
-            <p:cNvSpPr/>
-            <p:nvPr/>
-          </p:nvSpPr>
-          <p:spPr>
-            <a:xfrm>
-              <a:off x="5269750" y="1438188"/>
-              <a:ext cx="1210785" cy="1384525"/>
-            </a:xfrm>
-            <a:prstGeom prst="roundRect">
-              <a:avLst>
-                <a:gd name="adj" fmla="val 6590"/>
-              </a:avLst>
-            </a:prstGeom>
-            <a:solidFill>
-              <a:schemeClr val="bg1"/>
-            </a:solidFill>
-          </p:spPr>
-          <p:style>
-            <a:lnRef idx="2">
-              <a:schemeClr val="accent1">
-                <a:shade val="50000"/>
-              </a:schemeClr>
-            </a:lnRef>
-            <a:fillRef idx="1">
-              <a:schemeClr val="accent1"/>
-            </a:fillRef>
-            <a:effectRef idx="0">
-              <a:schemeClr val="accent1"/>
-            </a:effectRef>
-            <a:fontRef idx="minor">
-              <a:schemeClr val="lt1"/>
-            </a:fontRef>
-          </p:style>
-          <p:txBody>
-            <a:bodyPr rtlCol="0" anchor="ctr"/>
-            <a:lstStyle/>
-            <a:p>
-              <a:pPr algn="ctr"/>
-              <a:endParaRPr lang="en-US"/>
-            </a:p>
-          </p:txBody>
-        </p:sp>
-        <p:grpSp>
-          <p:nvGrpSpPr>
-            <p:cNvPr id="167" name="Group 166">
-              <a:extLst>
-                <a:ext uri="{FF2B5EF4-FFF2-40B4-BE49-F238E27FC236}">
-                  <a16:creationId xmlns:a16="http://schemas.microsoft.com/office/drawing/2014/main" id="{DBFAA4BD-4A8E-45BF-886A-BFBB1B8CD2F9}"/>
-                </a:ext>
-              </a:extLst>
-            </p:cNvPr>
-            <p:cNvGrpSpPr/>
-            <p:nvPr/>
-          </p:nvGrpSpPr>
-          <p:grpSpPr>
-            <a:xfrm>
-              <a:off x="5269750" y="1550249"/>
-              <a:ext cx="1210785" cy="1274521"/>
-              <a:chOff x="4319032" y="3033136"/>
-              <a:chExt cx="1210785" cy="1274521"/>
-            </a:xfrm>
-          </p:grpSpPr>
-          <p:pic>
-            <p:nvPicPr>
-              <p:cNvPr id="168" name="Graphic 167">
-                <a:extLst>
-                  <a:ext uri="{FF2B5EF4-FFF2-40B4-BE49-F238E27FC236}">
-                    <a16:creationId xmlns:a16="http://schemas.microsoft.com/office/drawing/2014/main" id="{2781A7B2-05C6-4857-9571-F9AAEE0D1D1A}"/>
-                  </a:ext>
-                </a:extLst>
-              </p:cNvPr>
-              <p:cNvPicPr>
-                <a:picLocks noChangeAspect="1"/>
-              </p:cNvPicPr>
-              <p:nvPr/>
-            </p:nvPicPr>
-            <p:blipFill>
-              <a:blip r:embed="rId4">
-                <a:extLst>
-                  <a:ext uri="{28A0092B-C50C-407E-A947-70E740481C1C}">
-                    <a14:useLocalDpi xmlns:a14="http://schemas.microsoft.com/office/drawing/2010/main" val="0"/>
-                  </a:ext>
-                </a:extLst>
-              </a:blip>
-              <a:stretch>
-                <a:fillRect/>
-              </a:stretch>
-            </p:blipFill>
-            <p:spPr>
-              <a:xfrm>
-                <a:off x="4686300" y="3033136"/>
-                <a:ext cx="476250" cy="360967"/>
-              </a:xfrm>
-              <a:prstGeom prst="rect">
-                <a:avLst/>
-              </a:prstGeom>
-            </p:spPr>
-          </p:pic>
-          <p:sp>
-            <p:nvSpPr>
-              <p:cNvPr id="169" name="TextBox 168">
-                <a:extLst>
-                  <a:ext uri="{FF2B5EF4-FFF2-40B4-BE49-F238E27FC236}">
-                    <a16:creationId xmlns:a16="http://schemas.microsoft.com/office/drawing/2014/main" id="{B829A4AA-2F99-4138-87C2-E1F1805A06D8}"/>
-                  </a:ext>
-                </a:extLst>
-              </p:cNvPr>
-              <p:cNvSpPr txBox="1"/>
-              <p:nvPr/>
-            </p:nvSpPr>
-            <p:spPr>
-              <a:xfrm>
-                <a:off x="4319032" y="3476660"/>
-                <a:ext cx="1210785" cy="830997"/>
-              </a:xfrm>
-              <a:prstGeom prst="rect">
-                <a:avLst/>
-              </a:prstGeom>
-              <a:noFill/>
-            </p:spPr>
-            <p:txBody>
-              <a:bodyPr wrap="square" rtlCol="0">
-                <a:spAutoFit/>
-              </a:bodyPr>
-              <a:lstStyle/>
-              <a:p>
-                <a:pPr algn="ctr"/>
-                <a:r>
-                  <a:rPr lang="en-US" sz="1400" dirty="0"/>
-                  <a:t>Azure Notebooks</a:t>
-                </a:r>
-                <a:endParaRPr lang="en-US" sz="1100" dirty="0"/>
-              </a:p>
-              <a:p>
-                <a:pPr algn="ctr"/>
-                <a:r>
-                  <a:rPr lang="en-US" sz="1000" dirty="0"/>
-                  <a:t>ML Pipeline, Train, Eval Scripts</a:t>
-                </a:r>
-              </a:p>
-            </p:txBody>
-          </p:sp>
-        </p:grpSp>
-      </p:grpSp>
-      <p:grpSp>
-        <p:nvGrpSpPr>
           <p:cNvPr id="212" name="Group 211">
             <a:extLst>
               <a:ext uri="{FF2B5EF4-FFF2-40B4-BE49-F238E27FC236}">
@@ -8997,13 +8836,13 @@
               <p:nvPr/>
             </p:nvPicPr>
             <p:blipFill>
-              <a:blip r:embed="rId5">
+              <a:blip r:embed="rId4">
                 <a:extLst>
                   <a:ext uri="{28A0092B-C50C-407E-A947-70E740481C1C}">
                     <a14:useLocalDpi xmlns:a14="http://schemas.microsoft.com/office/drawing/2010/main" val="0"/>
                   </a:ext>
                   <a:ext uri="{96DAC541-7B7A-43D3-8B79-37D633B846F1}">
-                    <asvg:svgBlip xmlns:asvg="http://schemas.microsoft.com/office/drawing/2016/SVG/main" r:embed="rId6"/>
+                    <asvg:svgBlip xmlns:asvg="http://schemas.microsoft.com/office/drawing/2016/SVG/main" r:embed="rId5"/>
                   </a:ext>
                 </a:extLst>
               </a:blip>
@@ -9153,13 +8992,13 @@
             <p:nvPr/>
           </p:nvPicPr>
           <p:blipFill>
-            <a:blip r:embed="rId7">
+            <a:blip r:embed="rId6">
               <a:extLst>
                 <a:ext uri="{28A0092B-C50C-407E-A947-70E740481C1C}">
                   <a14:useLocalDpi xmlns:a14="http://schemas.microsoft.com/office/drawing/2010/main" val="0"/>
                 </a:ext>
                 <a:ext uri="{96DAC541-7B7A-43D3-8B79-37D633B846F1}">
-                  <asvg:svgBlip xmlns:asvg="http://schemas.microsoft.com/office/drawing/2016/SVG/main" r:embed="rId8"/>
+                  <asvg:svgBlip xmlns:asvg="http://schemas.microsoft.com/office/drawing/2016/SVG/main" r:embed="rId7"/>
                 </a:ext>
               </a:extLst>
             </a:blip>
@@ -9502,13 +9341,13 @@
               <p:nvPr/>
             </p:nvPicPr>
             <p:blipFill>
-              <a:blip r:embed="rId9">
+              <a:blip r:embed="rId8">
                 <a:extLst>
                   <a:ext uri="{28A0092B-C50C-407E-A947-70E740481C1C}">
                     <a14:useLocalDpi xmlns:a14="http://schemas.microsoft.com/office/drawing/2010/main" val="0"/>
                   </a:ext>
                   <a:ext uri="{96DAC541-7B7A-43D3-8B79-37D633B846F1}">
-                    <asvg:svgBlip xmlns:asvg="http://schemas.microsoft.com/office/drawing/2016/SVG/main" r:embed="rId10"/>
+                    <asvg:svgBlip xmlns:asvg="http://schemas.microsoft.com/office/drawing/2016/SVG/main" r:embed="rId9"/>
                   </a:ext>
                 </a:extLst>
               </a:blip>
@@ -9758,7 +9597,7 @@
                 <p:nvPr/>
               </p:nvPicPr>
               <p:blipFill>
-                <a:blip r:embed="rId11">
+                <a:blip r:embed="rId10">
                   <a:extLst>
                     <a:ext uri="{28A0092B-C50C-407E-A947-70E740481C1C}">
                       <a14:useLocalDpi xmlns:a14="http://schemas.microsoft.com/office/drawing/2010/main" val="0"/>
@@ -9931,7 +9770,7 @@
                 <p:nvPr/>
               </p:nvPicPr>
               <p:blipFill>
-                <a:blip r:embed="rId12">
+                <a:blip r:embed="rId11">
                   <a:extLst>
                     <a:ext uri="{28A0092B-C50C-407E-A947-70E740481C1C}">
                       <a14:useLocalDpi xmlns:a14="http://schemas.microsoft.com/office/drawing/2010/main" val="0"/>
@@ -10283,13 +10122,13 @@
             <p:nvPr/>
           </p:nvPicPr>
           <p:blipFill>
-            <a:blip r:embed="rId9">
+            <a:blip r:embed="rId8">
               <a:extLst>
                 <a:ext uri="{28A0092B-C50C-407E-A947-70E740481C1C}">
                   <a14:useLocalDpi xmlns:a14="http://schemas.microsoft.com/office/drawing/2010/main" val="0"/>
                 </a:ext>
                 <a:ext uri="{96DAC541-7B7A-43D3-8B79-37D633B846F1}">
-                  <asvg:svgBlip xmlns:asvg="http://schemas.microsoft.com/office/drawing/2016/SVG/main" r:embed="rId10"/>
+                  <asvg:svgBlip xmlns:asvg="http://schemas.microsoft.com/office/drawing/2016/SVG/main" r:embed="rId9"/>
                 </a:ext>
               </a:extLst>
             </a:blip>
@@ -11397,13 +11236,13 @@
             <p:nvPr/>
           </p:nvPicPr>
           <p:blipFill>
-            <a:blip r:embed="rId9">
+            <a:blip r:embed="rId8">
               <a:extLst>
                 <a:ext uri="{28A0092B-C50C-407E-A947-70E740481C1C}">
                   <a14:useLocalDpi xmlns:a14="http://schemas.microsoft.com/office/drawing/2010/main" val="0"/>
                 </a:ext>
                 <a:ext uri="{96DAC541-7B7A-43D3-8B79-37D633B846F1}">
-                  <asvg:svgBlip xmlns:asvg="http://schemas.microsoft.com/office/drawing/2016/SVG/main" r:embed="rId10"/>
+                  <asvg:svgBlip xmlns:asvg="http://schemas.microsoft.com/office/drawing/2016/SVG/main" r:embed="rId9"/>
                 </a:ext>
               </a:extLst>
             </a:blip>
@@ -11980,7 +11819,6 @@
           </p:cNvPr>
           <p:cNvCxnSpPr>
             <a:cxnSpLocks/>
-            <a:stCxn id="166" idx="2"/>
             <a:endCxn id="279" idx="1"/>
           </p:cNvCxnSpPr>
           <p:nvPr/>
@@ -12494,6 +12332,191 @@
           </a:p>
         </p:txBody>
       </p:sp>
+      <p:grpSp>
+        <p:nvGrpSpPr>
+          <p:cNvPr id="94" name="Group 93">
+            <a:extLst>
+              <a:ext uri="{FF2B5EF4-FFF2-40B4-BE49-F238E27FC236}">
+                <a16:creationId xmlns:a16="http://schemas.microsoft.com/office/drawing/2014/main" id="{9B4DCA6C-29DC-47BB-AAAD-0A93406A9511}"/>
+              </a:ext>
+            </a:extLst>
+          </p:cNvPr>
+          <p:cNvGrpSpPr/>
+          <p:nvPr/>
+        </p:nvGrpSpPr>
+        <p:grpSpPr>
+          <a:xfrm>
+            <a:off x="122697" y="120919"/>
+            <a:ext cx="1217211" cy="1384525"/>
+            <a:chOff x="5269750" y="1438188"/>
+            <a:chExt cx="1217211" cy="1384525"/>
+          </a:xfrm>
+        </p:grpSpPr>
+        <p:sp>
+          <p:nvSpPr>
+            <p:cNvPr id="95" name="Rectangle: Rounded Corners 94">
+              <a:extLst>
+                <a:ext uri="{FF2B5EF4-FFF2-40B4-BE49-F238E27FC236}">
+                  <a16:creationId xmlns:a16="http://schemas.microsoft.com/office/drawing/2014/main" id="{634B9A7B-B3A8-45CD-91C7-A104166884DD}"/>
+                </a:ext>
+              </a:extLst>
+            </p:cNvPr>
+            <p:cNvSpPr/>
+            <p:nvPr/>
+          </p:nvSpPr>
+          <p:spPr>
+            <a:xfrm>
+              <a:off x="5269750" y="1438188"/>
+              <a:ext cx="1210785" cy="1384525"/>
+            </a:xfrm>
+            <a:prstGeom prst="roundRect">
+              <a:avLst>
+                <a:gd name="adj" fmla="val 6590"/>
+              </a:avLst>
+            </a:prstGeom>
+            <a:solidFill>
+              <a:schemeClr val="bg1"/>
+            </a:solidFill>
+          </p:spPr>
+          <p:style>
+            <a:lnRef idx="2">
+              <a:schemeClr val="accent1">
+                <a:shade val="50000"/>
+              </a:schemeClr>
+            </a:lnRef>
+            <a:fillRef idx="1">
+              <a:schemeClr val="accent1"/>
+            </a:fillRef>
+            <a:effectRef idx="0">
+              <a:schemeClr val="accent1"/>
+            </a:effectRef>
+            <a:fontRef idx="minor">
+              <a:schemeClr val="lt1"/>
+            </a:fontRef>
+          </p:style>
+          <p:txBody>
+            <a:bodyPr rtlCol="0" anchor="ctr"/>
+            <a:lstStyle/>
+            <a:p>
+              <a:pPr algn="ctr"/>
+              <a:endParaRPr lang="en-US"/>
+            </a:p>
+          </p:txBody>
+        </p:sp>
+        <p:sp>
+          <p:nvSpPr>
+            <p:cNvPr id="96" name="TextBox 95">
+              <a:extLst>
+                <a:ext uri="{FF2B5EF4-FFF2-40B4-BE49-F238E27FC236}">
+                  <a16:creationId xmlns:a16="http://schemas.microsoft.com/office/drawing/2014/main" id="{DFC15709-867E-40D8-873A-D821BD55B135}"/>
+                </a:ext>
+              </a:extLst>
+            </p:cNvPr>
+            <p:cNvSpPr txBox="1"/>
+            <p:nvPr/>
+          </p:nvSpPr>
+          <p:spPr>
+            <a:xfrm>
+              <a:off x="5276176" y="2201220"/>
+              <a:ext cx="1210785" cy="615553"/>
+            </a:xfrm>
+            <a:prstGeom prst="rect">
+              <a:avLst/>
+            </a:prstGeom>
+            <a:noFill/>
+          </p:spPr>
+          <p:txBody>
+            <a:bodyPr wrap="square" rtlCol="0">
+              <a:spAutoFit/>
+            </a:bodyPr>
+            <a:lstStyle/>
+            <a:p>
+              <a:pPr algn="ctr"/>
+              <a:r>
+                <a:rPr lang="en-US" sz="1400" dirty="0"/>
+                <a:t>Notebooks</a:t>
+              </a:r>
+              <a:endParaRPr lang="en-US" sz="1100" dirty="0"/>
+            </a:p>
+            <a:p>
+              <a:pPr algn="ctr"/>
+              <a:r>
+                <a:rPr lang="en-US" sz="1000" dirty="0"/>
+                <a:t>ML Pipeline, Train, Eval Scripts</a:t>
+              </a:r>
+            </a:p>
+          </p:txBody>
+        </p:sp>
+      </p:grpSp>
+      <p:pic>
+        <p:nvPicPr>
+          <p:cNvPr id="97" name="Graphic 96">
+            <a:extLst>
+              <a:ext uri="{FF2B5EF4-FFF2-40B4-BE49-F238E27FC236}">
+                <a16:creationId xmlns:a16="http://schemas.microsoft.com/office/drawing/2014/main" id="{AFFA0B5F-D82E-40CD-AFD1-CC3F33D380D4}"/>
+              </a:ext>
+            </a:extLst>
+          </p:cNvPr>
+          <p:cNvPicPr>
+            <a:picLocks noChangeAspect="1"/>
+          </p:cNvPicPr>
+          <p:nvPr/>
+        </p:nvPicPr>
+        <p:blipFill>
+          <a:blip r:embed="rId2">
+            <a:extLst>
+              <a:ext uri="{28A0092B-C50C-407E-A947-70E740481C1C}">
+                <a14:useLocalDpi xmlns:a14="http://schemas.microsoft.com/office/drawing/2010/main" val="0"/>
+              </a:ext>
+              <a:ext uri="{96DAC541-7B7A-43D3-8B79-37D633B846F1}">
+                <asvg:svgBlip xmlns:asvg="http://schemas.microsoft.com/office/drawing/2016/SVG/main" r:embed="rId3"/>
+              </a:ext>
+            </a:extLst>
+          </a:blip>
+          <a:stretch>
+            <a:fillRect/>
+          </a:stretch>
+        </p:blipFill>
+        <p:spPr>
+          <a:xfrm>
+            <a:off x="486768" y="393381"/>
+            <a:ext cx="442298" cy="476250"/>
+          </a:xfrm>
+          <a:prstGeom prst="rect">
+            <a:avLst/>
+          </a:prstGeom>
+        </p:spPr>
+      </p:pic>
+      <p:pic>
+        <p:nvPicPr>
+          <p:cNvPr id="98" name="Picture 97">
+            <a:extLst>
+              <a:ext uri="{FF2B5EF4-FFF2-40B4-BE49-F238E27FC236}">
+                <a16:creationId xmlns:a16="http://schemas.microsoft.com/office/drawing/2014/main" id="{3E4E69C9-D17E-4CA3-B51B-132A1238A08E}"/>
+              </a:ext>
+            </a:extLst>
+          </p:cNvPr>
+          <p:cNvPicPr>
+            <a:picLocks noChangeAspect="1"/>
+          </p:cNvPicPr>
+          <p:nvPr/>
+        </p:nvPicPr>
+        <p:blipFill>
+          <a:blip r:embed="rId12"/>
+          <a:stretch>
+            <a:fillRect/>
+          </a:stretch>
+        </p:blipFill>
+        <p:spPr>
+          <a:xfrm>
+            <a:off x="814317" y="202859"/>
+            <a:ext cx="442041" cy="428544"/>
+          </a:xfrm>
+          <a:prstGeom prst="rect">
+            <a:avLst/>
+          </a:prstGeom>
+        </p:spPr>
+      </p:pic>
     </p:spTree>
     <p:extLst>
       <p:ext uri="{BB962C8B-B14F-4D97-AF65-F5344CB8AC3E}">

</xml_diff>